<commit_message>
add pages to presentation
</commit_message>
<xml_diff>
--- a/presentazione/Radixsort.pptx
+++ b/presentazione/Radixsort.pptx
@@ -9,12 +9,14 @@
     <p:sldId id="257" r:id="rId3"/>
     <p:sldId id="259" r:id="rId4"/>
     <p:sldId id="260" r:id="rId5"/>
-    <p:sldId id="261" r:id="rId6"/>
-    <p:sldId id="262" r:id="rId7"/>
-    <p:sldId id="265" r:id="rId8"/>
-    <p:sldId id="264" r:id="rId9"/>
-    <p:sldId id="266" r:id="rId10"/>
-    <p:sldId id="267" r:id="rId11"/>
+    <p:sldId id="269" r:id="rId6"/>
+    <p:sldId id="261" r:id="rId7"/>
+    <p:sldId id="262" r:id="rId8"/>
+    <p:sldId id="265" r:id="rId9"/>
+    <p:sldId id="264" r:id="rId10"/>
+    <p:sldId id="266" r:id="rId11"/>
+    <p:sldId id="267" r:id="rId12"/>
+    <p:sldId id="268" r:id="rId13"/>
   </p:sldIdLst>
   <p:sldSz cx="12192000" cy="6858000"/>
   <p:notesSz cx="6858000" cy="9144000"/>
@@ -4090,18 +4092,385 @@
           <a:bodyPr/>
           <a:lstStyle/>
           <a:p>
+            <a:r>
+              <a:rPr lang="it-IT" cap="none" dirty="0" err="1" smtClean="0"/>
+              <a:t>max</a:t>
+            </a:r>
+            <a:r>
+              <a:rPr lang="it-IT" cap="none" dirty="0" smtClean="0">
+                <a:latin typeface="Adobe Fan Heiti Std B" panose="020B0700000000000000" pitchFamily="34" charset="-128"/>
+                <a:ea typeface="Adobe Fan Heiti Std B" panose="020B0700000000000000" pitchFamily="34" charset="-128"/>
+              </a:rPr>
+              <a:t>()</a:t>
+            </a:r>
+            <a:endParaRPr lang="it-IT" cap="none" dirty="0"/>
+          </a:p>
+        </p:txBody>
+      </p:sp>
+      <p:sp>
+        <p:nvSpPr>
+          <p:cNvPr id="3" name="Segnaposto contenuto 2"/>
+          <p:cNvSpPr>
+            <a:spLocks noGrp="1"/>
+          </p:cNvSpPr>
+          <p:nvPr>
+            <p:ph idx="1"/>
+          </p:nvPr>
+        </p:nvSpPr>
+        <p:spPr>
+          <a:xfrm>
+            <a:off x="1069848" y="2205609"/>
+            <a:ext cx="4784852" cy="380492"/>
+          </a:xfrm>
+        </p:spPr>
+        <p:txBody>
+          <a:bodyPr>
+            <a:normAutofit/>
+          </a:bodyPr>
+          <a:lstStyle/>
+          <a:p>
+            <a:pPr marL="0" indent="0">
+              <a:buNone/>
+            </a:pPr>
+            <a:r>
+              <a:rPr lang="it-IT" dirty="0"/>
+              <a:t>C++	algorithm_cpp/radix.cpp</a:t>
+            </a:r>
             <a:endParaRPr lang="it-IT" dirty="0"/>
           </a:p>
         </p:txBody>
       </p:sp>
       <p:sp>
         <p:nvSpPr>
-          <p:cNvPr id="3" name="Segnaposto contenuto 2"/>
-          <p:cNvSpPr>
-            <a:spLocks noGrp="1"/>
-          </p:cNvSpPr>
-          <p:nvPr>
-            <p:ph idx="1"/>
+          <p:cNvPr id="9" name="CasellaDiTesto 8"/>
+          <p:cNvSpPr txBox="1"/>
+          <p:nvPr/>
+        </p:nvSpPr>
+        <p:spPr>
+          <a:xfrm>
+            <a:off x="6822249" y="324350"/>
+            <a:ext cx="3334311" cy="400110"/>
+          </a:xfrm>
+          <a:prstGeom prst="rect">
+            <a:avLst/>
+          </a:prstGeom>
+          <a:noFill/>
+        </p:spPr>
+        <p:txBody>
+          <a:bodyPr wrap="none" rtlCol="0">
+            <a:spAutoFit/>
+          </a:bodyPr>
+          <a:lstStyle/>
+          <a:p>
+            <a:r>
+              <a:rPr lang="it-IT" sz="2000" dirty="0" smtClean="0"/>
+              <a:t>RISC-V		</a:t>
+            </a:r>
+            <a:r>
+              <a:rPr lang="it-IT" sz="2000" dirty="0" err="1" smtClean="0"/>
+              <a:t>src</a:t>
+            </a:r>
+            <a:r>
+              <a:rPr lang="it-IT" sz="2000" dirty="0" smtClean="0"/>
+              <a:t>/</a:t>
+            </a:r>
+            <a:r>
+              <a:rPr lang="it-IT" sz="2000" dirty="0" err="1" smtClean="0"/>
+              <a:t>arrayutils.s</a:t>
+            </a:r>
+            <a:endParaRPr lang="it-IT" dirty="0"/>
+          </a:p>
+        </p:txBody>
+      </p:sp>
+      <p:pic>
+        <p:nvPicPr>
+          <p:cNvPr id="4" name="Immagine 3"/>
+          <p:cNvPicPr>
+            <a:picLocks noChangeAspect="1"/>
+          </p:cNvPicPr>
+          <p:nvPr/>
+        </p:nvPicPr>
+        <p:blipFill>
+          <a:blip r:embed="rId2"/>
+          <a:stretch>
+            <a:fillRect/>
+          </a:stretch>
+        </p:blipFill>
+        <p:spPr>
+          <a:xfrm>
+            <a:off x="1069848" y="2586101"/>
+            <a:ext cx="5301923" cy="2357858"/>
+          </a:xfrm>
+          <a:prstGeom prst="rect">
+            <a:avLst/>
+          </a:prstGeom>
+        </p:spPr>
+      </p:pic>
+      <p:pic>
+        <p:nvPicPr>
+          <p:cNvPr id="6" name="Immagine 5"/>
+          <p:cNvPicPr>
+            <a:picLocks noChangeAspect="1"/>
+          </p:cNvPicPr>
+          <p:nvPr/>
+        </p:nvPicPr>
+        <p:blipFill>
+          <a:blip r:embed="rId3"/>
+          <a:stretch>
+            <a:fillRect/>
+          </a:stretch>
+        </p:blipFill>
+        <p:spPr>
+          <a:xfrm>
+            <a:off x="6822249" y="724459"/>
+            <a:ext cx="4493451" cy="5575001"/>
+          </a:xfrm>
+          <a:prstGeom prst="rect">
+            <a:avLst/>
+          </a:prstGeom>
+        </p:spPr>
+      </p:pic>
+      <p:cxnSp>
+        <p:nvCxnSpPr>
+          <p:cNvPr id="8" name="Connettore 4 7"/>
+          <p:cNvCxnSpPr/>
+          <p:nvPr/>
+        </p:nvCxnSpPr>
+        <p:spPr>
+          <a:xfrm flipV="1">
+            <a:off x="3251200" y="1917700"/>
+            <a:ext cx="3822700" cy="1574800"/>
+          </a:xfrm>
+          <a:prstGeom prst="bentConnector3">
+            <a:avLst>
+              <a:gd name="adj1" fmla="val 79900"/>
+            </a:avLst>
+          </a:prstGeom>
+          <a:ln>
+            <a:tailEnd type="triangle"/>
+          </a:ln>
+        </p:spPr>
+        <p:style>
+          <a:lnRef idx="1">
+            <a:schemeClr val="accent1"/>
+          </a:lnRef>
+          <a:fillRef idx="0">
+            <a:schemeClr val="accent1"/>
+          </a:fillRef>
+          <a:effectRef idx="0">
+            <a:schemeClr val="accent1"/>
+          </a:effectRef>
+          <a:fontRef idx="minor">
+            <a:schemeClr val="tx1"/>
+          </a:fontRef>
+        </p:style>
+      </p:cxnSp>
+      <p:cxnSp>
+        <p:nvCxnSpPr>
+          <p:cNvPr id="12" name="Connettore 4 11"/>
+          <p:cNvCxnSpPr/>
+          <p:nvPr/>
+        </p:nvCxnSpPr>
+        <p:spPr>
+          <a:xfrm flipV="1">
+            <a:off x="4368800" y="2743200"/>
+            <a:ext cx="2453449" cy="1028700"/>
+          </a:xfrm>
+          <a:prstGeom prst="bentConnector3">
+            <a:avLst>
+              <a:gd name="adj1" fmla="val 89341"/>
+            </a:avLst>
+          </a:prstGeom>
+          <a:ln>
+            <a:tailEnd type="triangle"/>
+          </a:ln>
+        </p:spPr>
+        <p:style>
+          <a:lnRef idx="1">
+            <a:schemeClr val="accent1"/>
+          </a:lnRef>
+          <a:fillRef idx="0">
+            <a:schemeClr val="accent1"/>
+          </a:fillRef>
+          <a:effectRef idx="0">
+            <a:schemeClr val="accent1"/>
+          </a:effectRef>
+          <a:fontRef idx="minor">
+            <a:schemeClr val="tx1"/>
+          </a:fontRef>
+        </p:style>
+      </p:cxnSp>
+      <p:cxnSp>
+        <p:nvCxnSpPr>
+          <p:cNvPr id="15" name="Connettore 4 14"/>
+          <p:cNvCxnSpPr/>
+          <p:nvPr/>
+        </p:nvCxnSpPr>
+        <p:spPr>
+          <a:xfrm>
+            <a:off x="3708400" y="4264025"/>
+            <a:ext cx="3365500" cy="612775"/>
+          </a:xfrm>
+          <a:prstGeom prst="bentConnector3">
+            <a:avLst/>
+          </a:prstGeom>
+          <a:ln>
+            <a:tailEnd type="triangle"/>
+          </a:ln>
+        </p:spPr>
+        <p:style>
+          <a:lnRef idx="1">
+            <a:schemeClr val="accent1"/>
+          </a:lnRef>
+          <a:fillRef idx="0">
+            <a:schemeClr val="accent1"/>
+          </a:fillRef>
+          <a:effectRef idx="0">
+            <a:schemeClr val="accent1"/>
+          </a:effectRef>
+          <a:fontRef idx="minor">
+            <a:schemeClr val="tx1"/>
+          </a:fontRef>
+        </p:style>
+      </p:cxnSp>
+      <p:cxnSp>
+        <p:nvCxnSpPr>
+          <p:cNvPr id="18" name="Connettore 2 17"/>
+          <p:cNvCxnSpPr/>
+          <p:nvPr/>
+        </p:nvCxnSpPr>
+        <p:spPr>
+          <a:xfrm>
+            <a:off x="3670300" y="4011727"/>
+            <a:ext cx="3403600" cy="0"/>
+          </a:xfrm>
+          <a:prstGeom prst="straightConnector1">
+            <a:avLst/>
+          </a:prstGeom>
+          <a:ln>
+            <a:tailEnd type="triangle"/>
+          </a:ln>
+        </p:spPr>
+        <p:style>
+          <a:lnRef idx="1">
+            <a:schemeClr val="accent1"/>
+          </a:lnRef>
+          <a:fillRef idx="0">
+            <a:schemeClr val="accent1"/>
+          </a:fillRef>
+          <a:effectRef idx="0">
+            <a:schemeClr val="accent1"/>
+          </a:effectRef>
+          <a:fontRef idx="minor">
+            <a:schemeClr val="tx1"/>
+          </a:fontRef>
+        </p:style>
+      </p:cxnSp>
+      <p:cxnSp>
+        <p:nvCxnSpPr>
+          <p:cNvPr id="22" name="Connettore 1 21"/>
+          <p:cNvCxnSpPr/>
+          <p:nvPr/>
+        </p:nvCxnSpPr>
+        <p:spPr>
+          <a:xfrm>
+            <a:off x="7146131" y="1690688"/>
+            <a:ext cx="0" cy="669131"/>
+          </a:xfrm>
+          <a:prstGeom prst="line">
+            <a:avLst/>
+          </a:prstGeom>
+        </p:spPr>
+        <p:style>
+          <a:lnRef idx="1">
+            <a:schemeClr val="accent1"/>
+          </a:lnRef>
+          <a:fillRef idx="0">
+            <a:schemeClr val="accent1"/>
+          </a:fillRef>
+          <a:effectRef idx="0">
+            <a:schemeClr val="accent1"/>
+          </a:effectRef>
+          <a:fontRef idx="minor">
+            <a:schemeClr val="tx1"/>
+          </a:fontRef>
+        </p:style>
+      </p:cxnSp>
+      <p:cxnSp>
+        <p:nvCxnSpPr>
+          <p:cNvPr id="23" name="Connettore 1 22"/>
+          <p:cNvCxnSpPr/>
+          <p:nvPr/>
+        </p:nvCxnSpPr>
+        <p:spPr>
+          <a:xfrm flipH="1">
+            <a:off x="7146129" y="4614863"/>
+            <a:ext cx="2" cy="531063"/>
+          </a:xfrm>
+          <a:prstGeom prst="line">
+            <a:avLst/>
+          </a:prstGeom>
+        </p:spPr>
+        <p:style>
+          <a:lnRef idx="1">
+            <a:schemeClr val="accent1"/>
+          </a:lnRef>
+          <a:fillRef idx="0">
+            <a:schemeClr val="accent1"/>
+          </a:fillRef>
+          <a:effectRef idx="0">
+            <a:schemeClr val="accent1"/>
+          </a:effectRef>
+          <a:fontRef idx="minor">
+            <a:schemeClr val="tx1"/>
+          </a:fontRef>
+        </p:style>
+      </p:cxnSp>
+    </p:spTree>
+    <p:extLst>
+      <p:ext uri="{BB962C8B-B14F-4D97-AF65-F5344CB8AC3E}">
+        <p14:creationId xmlns:p14="http://schemas.microsoft.com/office/powerpoint/2010/main" val="3434721489"/>
+      </p:ext>
+    </p:extLst>
+  </p:cSld>
+  <p:clrMapOvr>
+    <a:masterClrMapping/>
+  </p:clrMapOvr>
+  <p:timing>
+    <p:tnLst>
+      <p:par>
+        <p:cTn id="1" dur="indefinite" restart="never" nodeType="tmRoot"/>
+      </p:par>
+    </p:tnLst>
+  </p:timing>
+</p:sld>
+</file>
+
+<file path=ppt/slides/slide11.xml><?xml version="1.0" encoding="utf-8"?>
+<p:sld xmlns:a="http://schemas.openxmlformats.org/drawingml/2006/main" xmlns:r="http://schemas.openxmlformats.org/officeDocument/2006/relationships" xmlns:p="http://schemas.openxmlformats.org/presentationml/2006/main">
+  <p:cSld>
+    <p:spTree>
+      <p:nvGrpSpPr>
+        <p:cNvPr id="1" name=""/>
+        <p:cNvGrpSpPr/>
+        <p:nvPr/>
+      </p:nvGrpSpPr>
+      <p:grpSpPr>
+        <a:xfrm>
+          <a:off x="0" y="0"/>
+          <a:ext cx="0" cy="0"/>
+          <a:chOff x="0" y="0"/>
+          <a:chExt cx="0" cy="0"/>
+        </a:xfrm>
+      </p:grpSpPr>
+      <p:sp>
+        <p:nvSpPr>
+          <p:cNvPr id="2" name="Titolo 1"/>
+          <p:cNvSpPr>
+            <a:spLocks noGrp="1"/>
+          </p:cNvSpPr>
+          <p:nvPr>
+            <p:ph type="title"/>
           </p:nvPr>
         </p:nvSpPr>
         <p:spPr/>
@@ -4109,7 +4478,131 @@
           <a:bodyPr/>
           <a:lstStyle/>
           <a:p>
-            <a:endParaRPr lang="it-IT"/>
+            <a:r>
+              <a:rPr lang="it-IT" cap="none" dirty="0" err="1" smtClean="0"/>
+              <a:t>Debug</a:t>
+            </a:r>
+            <a:r>
+              <a:rPr lang="it-IT" cap="none" dirty="0" smtClean="0"/>
+              <a:t> e Risultati</a:t>
+            </a:r>
+            <a:endParaRPr lang="it-IT" cap="none" dirty="0"/>
+          </a:p>
+        </p:txBody>
+      </p:sp>
+      <p:sp>
+        <p:nvSpPr>
+          <p:cNvPr id="3" name="Segnaposto contenuto 2"/>
+          <p:cNvSpPr>
+            <a:spLocks noGrp="1"/>
+          </p:cNvSpPr>
+          <p:nvPr>
+            <p:ph idx="1"/>
+          </p:nvPr>
+        </p:nvSpPr>
+        <p:spPr/>
+        <p:txBody>
+          <a:bodyPr/>
+          <a:lstStyle/>
+          <a:p>
+            <a:r>
+              <a:rPr lang="it-IT" dirty="0" smtClean="0"/>
+              <a:t>Compile &amp; </a:t>
+            </a:r>
+            <a:r>
+              <a:rPr lang="it-IT" dirty="0" err="1" smtClean="0"/>
+              <a:t>Run</a:t>
+            </a:r>
+            <a:endParaRPr lang="it-IT" dirty="0" smtClean="0"/>
+          </a:p>
+          <a:p>
+            <a:pPr lvl="1"/>
+            <a:r>
+              <a:rPr lang="it-IT" dirty="0" smtClean="0"/>
+              <a:t>Terminale 1:		$ ./build.sh</a:t>
+            </a:r>
+          </a:p>
+          <a:p>
+            <a:pPr lvl="1"/>
+            <a:r>
+              <a:rPr lang="it-IT" dirty="0" smtClean="0"/>
+              <a:t>Terminale 2:		$ ./debug.sh</a:t>
+            </a:r>
+          </a:p>
+          <a:p>
+            <a:pPr marL="274320" lvl="1" indent="0">
+              <a:buNone/>
+            </a:pPr>
+            <a:r>
+              <a:rPr lang="it-IT" dirty="0" smtClean="0"/>
+              <a:t>La variabile di I/O appare nel </a:t>
+            </a:r>
+            <a:r>
+              <a:rPr lang="it-IT" dirty="0" err="1" smtClean="0"/>
+              <a:t>debugger</a:t>
+            </a:r>
+            <a:r>
+              <a:rPr lang="it-IT" dirty="0" smtClean="0"/>
+              <a:t> in automatico</a:t>
+            </a:r>
+          </a:p>
+          <a:p>
+            <a:pPr lvl="1"/>
+            <a:endParaRPr lang="it-IT" dirty="0" smtClean="0"/>
+          </a:p>
+          <a:p>
+            <a:r>
+              <a:rPr lang="it-IT" dirty="0" smtClean="0"/>
+              <a:t>Risultati ottenuti</a:t>
+            </a:r>
+          </a:p>
+          <a:p>
+            <a:pPr lvl="1"/>
+            <a:r>
+              <a:rPr lang="it-IT" dirty="0" smtClean="0"/>
+              <a:t>{</a:t>
+            </a:r>
+            <a:r>
+              <a:rPr lang="it-IT" dirty="0"/>
+              <a:t>170, 45, 75, 90, 802, 69, 4, </a:t>
+            </a:r>
+            <a:r>
+              <a:rPr lang="it-IT" dirty="0" smtClean="0"/>
+              <a:t>20}		 {4, 20, 45</a:t>
+            </a:r>
+            <a:r>
+              <a:rPr lang="it-IT" dirty="0"/>
+              <a:t>, </a:t>
+            </a:r>
+            <a:r>
+              <a:rPr lang="it-IT" dirty="0" smtClean="0"/>
+              <a:t>69, 75, 90, 170, 802}</a:t>
+            </a:r>
+          </a:p>
+          <a:p>
+            <a:pPr lvl="1"/>
+            <a:r>
+              <a:rPr lang="it-IT" dirty="0" smtClean="0"/>
+              <a:t>{423, 65, 1004, 53, 5}</a:t>
+            </a:r>
+          </a:p>
+          <a:p>
+            <a:pPr lvl="1"/>
+            <a:r>
+              <a:rPr lang="it-IT" dirty="0" smtClean="0"/>
+              <a:t>{2, 90, 20, 1}</a:t>
+            </a:r>
+          </a:p>
+          <a:p>
+            <a:pPr lvl="1"/>
+            <a:r>
+              <a:rPr lang="it-IT" dirty="0" smtClean="0"/>
+              <a:t>{24985,399824,2342}</a:t>
+            </a:r>
+          </a:p>
+          <a:p>
+            <a:pPr lvl="1"/>
+            <a:endParaRPr lang="it-IT" dirty="0"/>
           </a:p>
         </p:txBody>
       </p:sp>
@@ -4117,6 +4610,78 @@
     <p:extLst>
       <p:ext uri="{BB962C8B-B14F-4D97-AF65-F5344CB8AC3E}">
         <p14:creationId xmlns:p14="http://schemas.microsoft.com/office/powerpoint/2010/main" val="741266797"/>
+      </p:ext>
+    </p:extLst>
+  </p:cSld>
+  <p:clrMapOvr>
+    <a:masterClrMapping/>
+  </p:clrMapOvr>
+</p:sld>
+</file>
+
+<file path=ppt/slides/slide12.xml><?xml version="1.0" encoding="utf-8"?>
+<p:sld xmlns:a="http://schemas.openxmlformats.org/drawingml/2006/main" xmlns:r="http://schemas.openxmlformats.org/officeDocument/2006/relationships" xmlns:p="http://schemas.openxmlformats.org/presentationml/2006/main">
+  <p:cSld>
+    <p:spTree>
+      <p:nvGrpSpPr>
+        <p:cNvPr id="1" name=""/>
+        <p:cNvGrpSpPr/>
+        <p:nvPr/>
+      </p:nvGrpSpPr>
+      <p:grpSpPr>
+        <a:xfrm>
+          <a:off x="0" y="0"/>
+          <a:ext cx="0" cy="0"/>
+          <a:chOff x="0" y="0"/>
+          <a:chExt cx="0" cy="0"/>
+        </a:xfrm>
+      </p:grpSpPr>
+      <p:sp>
+        <p:nvSpPr>
+          <p:cNvPr id="2" name="Titolo 1"/>
+          <p:cNvSpPr>
+            <a:spLocks noGrp="1"/>
+          </p:cNvSpPr>
+          <p:nvPr>
+            <p:ph type="title"/>
+          </p:nvPr>
+        </p:nvSpPr>
+        <p:spPr/>
+        <p:txBody>
+          <a:bodyPr/>
+          <a:lstStyle/>
+          <a:p>
+            <a:r>
+              <a:rPr lang="it-IT" cap="none" dirty="0" smtClean="0"/>
+              <a:t>Conclusioni</a:t>
+            </a:r>
+            <a:endParaRPr lang="it-IT" cap="none" dirty="0"/>
+          </a:p>
+        </p:txBody>
+      </p:sp>
+      <p:sp>
+        <p:nvSpPr>
+          <p:cNvPr id="3" name="Segnaposto contenuto 2"/>
+          <p:cNvSpPr>
+            <a:spLocks noGrp="1"/>
+          </p:cNvSpPr>
+          <p:nvPr>
+            <p:ph idx="1"/>
+          </p:nvPr>
+        </p:nvSpPr>
+        <p:spPr/>
+        <p:txBody>
+          <a:bodyPr/>
+          <a:lstStyle/>
+          <a:p>
+            <a:endParaRPr lang="it-IT"/>
+          </a:p>
+        </p:txBody>
+      </p:sp>
+    </p:spTree>
+    <p:extLst>
+      <p:ext uri="{BB962C8B-B14F-4D97-AF65-F5344CB8AC3E}">
+        <p14:creationId xmlns:p14="http://schemas.microsoft.com/office/powerpoint/2010/main" val="4124807211"/>
       </p:ext>
     </p:extLst>
   </p:cSld>
@@ -4785,15 +5350,8 @@
           <a:lstStyle/>
           <a:p>
             <a:r>
-              <a:rPr lang="it-IT" cap="none" dirty="0" err="1" smtClean="0"/>
-              <a:t>radixsort</a:t>
-            </a:r>
-            <a:r>
-              <a:rPr lang="it-IT" cap="none" dirty="0" smtClean="0">
-                <a:latin typeface="Adobe Fan Heiti Std B" panose="020B0700000000000000" pitchFamily="34" charset="-128"/>
-                <a:ea typeface="Adobe Fan Heiti Std B" panose="020B0700000000000000" pitchFamily="34" charset="-128"/>
-              </a:rPr>
-              <a:t>()</a:t>
+              <a:rPr lang="it-IT" cap="none" dirty="0" smtClean="0"/>
+              <a:t>Costo Computazionale</a:t>
             </a:r>
             <a:endParaRPr lang="it-IT" cap="none" dirty="0"/>
           </a:p>
@@ -4809,227 +5367,25 @@
             <p:ph idx="1"/>
           </p:nvPr>
         </p:nvSpPr>
-        <p:spPr>
-          <a:xfrm>
-            <a:off x="1069848" y="2205609"/>
-            <a:ext cx="860552" cy="380492"/>
-          </a:xfrm>
-        </p:spPr>
+        <p:spPr/>
         <p:txBody>
           <a:bodyPr/>
           <a:lstStyle/>
           <a:p>
-            <a:pPr marL="0" indent="0">
-              <a:buNone/>
-            </a:pPr>
-            <a:r>
-              <a:rPr lang="it-IT" dirty="0" smtClean="0"/>
-              <a:t>C++</a:t>
-            </a:r>
             <a:endParaRPr lang="it-IT" dirty="0"/>
           </a:p>
         </p:txBody>
       </p:sp>
-      <p:pic>
-        <p:nvPicPr>
-          <p:cNvPr id="7" name="Immagine 6"/>
-          <p:cNvPicPr>
-            <a:picLocks noChangeAspect="1"/>
-          </p:cNvPicPr>
-          <p:nvPr/>
-        </p:nvPicPr>
-        <p:blipFill>
-          <a:blip r:embed="rId2"/>
-          <a:stretch>
-            <a:fillRect/>
-          </a:stretch>
-        </p:blipFill>
-        <p:spPr>
-          <a:xfrm>
-            <a:off x="1069848" y="2613025"/>
-            <a:ext cx="4707128" cy="3416030"/>
-          </a:xfrm>
-          <a:prstGeom prst="rect">
-            <a:avLst/>
-          </a:prstGeom>
-        </p:spPr>
-      </p:pic>
-      <p:pic>
-        <p:nvPicPr>
-          <p:cNvPr id="8" name="Immagine 7"/>
-          <p:cNvPicPr>
-            <a:picLocks noChangeAspect="1"/>
-          </p:cNvPicPr>
-          <p:nvPr/>
-        </p:nvPicPr>
-        <p:blipFill>
-          <a:blip r:embed="rId3"/>
-          <a:stretch>
-            <a:fillRect/>
-          </a:stretch>
-        </p:blipFill>
-        <p:spPr>
-          <a:xfrm>
-            <a:off x="6822249" y="819150"/>
-            <a:ext cx="3590925" cy="5829300"/>
-          </a:xfrm>
-          <a:prstGeom prst="rect">
-            <a:avLst/>
-          </a:prstGeom>
-        </p:spPr>
-      </p:pic>
-      <p:sp>
-        <p:nvSpPr>
-          <p:cNvPr id="9" name="CasellaDiTesto 8"/>
-          <p:cNvSpPr txBox="1"/>
-          <p:nvPr/>
-        </p:nvSpPr>
-        <p:spPr>
-          <a:xfrm>
-            <a:off x="6822249" y="324350"/>
-            <a:ext cx="1024639" cy="400110"/>
-          </a:xfrm>
-          <a:prstGeom prst="rect">
-            <a:avLst/>
-          </a:prstGeom>
-          <a:noFill/>
-        </p:spPr>
-        <p:txBody>
-          <a:bodyPr wrap="none" rtlCol="0">
-            <a:spAutoFit/>
-          </a:bodyPr>
-          <a:lstStyle/>
-          <a:p>
-            <a:r>
-              <a:rPr lang="it-IT" sz="2000" dirty="0" smtClean="0"/>
-              <a:t>RISC-V</a:t>
-            </a:r>
-            <a:endParaRPr lang="it-IT" dirty="0"/>
-          </a:p>
-        </p:txBody>
-      </p:sp>
-      <p:cxnSp>
-        <p:nvCxnSpPr>
-          <p:cNvPr id="11" name="Connettore 4 10"/>
-          <p:cNvCxnSpPr/>
-          <p:nvPr/>
-        </p:nvCxnSpPr>
-        <p:spPr>
-          <a:xfrm flipV="1">
-            <a:off x="4295775" y="1447800"/>
-            <a:ext cx="2526474" cy="2352675"/>
-          </a:xfrm>
-          <a:prstGeom prst="bentConnector3">
-            <a:avLst>
-              <a:gd name="adj1" fmla="val 37936"/>
-            </a:avLst>
-          </a:prstGeom>
-          <a:ln>
-            <a:tailEnd type="triangle"/>
-          </a:ln>
-        </p:spPr>
-        <p:style>
-          <a:lnRef idx="1">
-            <a:schemeClr val="accent1"/>
-          </a:lnRef>
-          <a:fillRef idx="0">
-            <a:schemeClr val="accent1"/>
-          </a:fillRef>
-          <a:effectRef idx="0">
-            <a:schemeClr val="accent1"/>
-          </a:effectRef>
-          <a:fontRef idx="minor">
-            <a:schemeClr val="tx1"/>
-          </a:fontRef>
-        </p:style>
-      </p:cxnSp>
-      <p:cxnSp>
-        <p:nvCxnSpPr>
-          <p:cNvPr id="26" name="Connettore 4 25"/>
-          <p:cNvCxnSpPr/>
-          <p:nvPr/>
-        </p:nvCxnSpPr>
-        <p:spPr>
-          <a:xfrm flipV="1">
-            <a:off x="4495800" y="4552950"/>
-            <a:ext cx="2326449" cy="1028700"/>
-          </a:xfrm>
-          <a:prstGeom prst="bentConnector3">
-            <a:avLst>
-              <a:gd name="adj1" fmla="val 87257"/>
-            </a:avLst>
-          </a:prstGeom>
-          <a:ln>
-            <a:tailEnd type="triangle"/>
-          </a:ln>
-        </p:spPr>
-        <p:style>
-          <a:lnRef idx="1">
-            <a:schemeClr val="accent1"/>
-          </a:lnRef>
-          <a:fillRef idx="0">
-            <a:schemeClr val="accent1"/>
-          </a:fillRef>
-          <a:effectRef idx="0">
-            <a:schemeClr val="accent1"/>
-          </a:effectRef>
-          <a:fontRef idx="minor">
-            <a:schemeClr val="tx1"/>
-          </a:fontRef>
-        </p:style>
-      </p:cxnSp>
-      <p:cxnSp>
-        <p:nvCxnSpPr>
-          <p:cNvPr id="29" name="Connettore 4 28"/>
-          <p:cNvCxnSpPr/>
-          <p:nvPr/>
-        </p:nvCxnSpPr>
-        <p:spPr>
-          <a:xfrm rot="5400000" flipH="1" flipV="1">
-            <a:off x="5431282" y="3945384"/>
-            <a:ext cx="1743837" cy="1052449"/>
-          </a:xfrm>
-          <a:prstGeom prst="bentConnector3">
-            <a:avLst>
-              <a:gd name="adj1" fmla="val 100251"/>
-            </a:avLst>
-          </a:prstGeom>
-          <a:ln>
-            <a:tailEnd type="triangle"/>
-          </a:ln>
-        </p:spPr>
-        <p:style>
-          <a:lnRef idx="1">
-            <a:schemeClr val="accent1"/>
-          </a:lnRef>
-          <a:fillRef idx="0">
-            <a:schemeClr val="accent1"/>
-          </a:fillRef>
-          <a:effectRef idx="0">
-            <a:schemeClr val="accent1"/>
-          </a:effectRef>
-          <a:fontRef idx="minor">
-            <a:schemeClr val="tx1"/>
-          </a:fontRef>
-        </p:style>
-      </p:cxnSp>
     </p:spTree>
     <p:extLst>
       <p:ext uri="{BB962C8B-B14F-4D97-AF65-F5344CB8AC3E}">
-        <p14:creationId xmlns:p14="http://schemas.microsoft.com/office/powerpoint/2010/main" val="3151084631"/>
+        <p14:creationId xmlns:p14="http://schemas.microsoft.com/office/powerpoint/2010/main" val="754968141"/>
       </p:ext>
     </p:extLst>
   </p:cSld>
   <p:clrMapOvr>
     <a:masterClrMapping/>
   </p:clrMapOvr>
-  <p:timing>
-    <p:tnLst>
-      <p:par>
-        <p:cTn id="1" dur="indefinite" restart="never" nodeType="tmRoot"/>
-      </p:par>
-    </p:tnLst>
-  </p:timing>
 </p:sld>
 </file>
 
@@ -5050,157 +5406,177 @@
           <a:chExt cx="0" cy="0"/>
         </a:xfrm>
       </p:grpSpPr>
+      <p:sp>
+        <p:nvSpPr>
+          <p:cNvPr id="2" name="Titolo 1"/>
+          <p:cNvSpPr>
+            <a:spLocks noGrp="1"/>
+          </p:cNvSpPr>
+          <p:nvPr>
+            <p:ph type="title"/>
+          </p:nvPr>
+        </p:nvSpPr>
+        <p:spPr/>
+        <p:txBody>
+          <a:bodyPr/>
+          <a:lstStyle/>
+          <a:p>
+            <a:r>
+              <a:rPr lang="it-IT" cap="none" dirty="0" err="1" smtClean="0"/>
+              <a:t>radixsort</a:t>
+            </a:r>
+            <a:r>
+              <a:rPr lang="it-IT" cap="none" dirty="0" smtClean="0">
+                <a:latin typeface="Adobe Fan Heiti Std B" panose="020B0700000000000000" pitchFamily="34" charset="-128"/>
+                <a:ea typeface="Adobe Fan Heiti Std B" panose="020B0700000000000000" pitchFamily="34" charset="-128"/>
+              </a:rPr>
+              <a:t>()</a:t>
+            </a:r>
+            <a:endParaRPr lang="it-IT" cap="none" dirty="0"/>
+          </a:p>
+        </p:txBody>
+      </p:sp>
+      <p:sp>
+        <p:nvSpPr>
+          <p:cNvPr id="3" name="Segnaposto contenuto 2"/>
+          <p:cNvSpPr>
+            <a:spLocks noGrp="1"/>
+          </p:cNvSpPr>
+          <p:nvPr>
+            <p:ph idx="1"/>
+          </p:nvPr>
+        </p:nvSpPr>
+        <p:spPr>
+          <a:xfrm>
+            <a:off x="1069848" y="2205609"/>
+            <a:ext cx="4530852" cy="380492"/>
+          </a:xfrm>
+        </p:spPr>
+        <p:txBody>
+          <a:bodyPr>
+            <a:normAutofit/>
+          </a:bodyPr>
+          <a:lstStyle/>
+          <a:p>
+            <a:pPr marL="0" indent="0">
+              <a:buNone/>
+            </a:pPr>
+            <a:r>
+              <a:rPr lang="it-IT" dirty="0" smtClean="0"/>
+              <a:t>C</a:t>
+            </a:r>
+            <a:r>
+              <a:rPr lang="it-IT" dirty="0" smtClean="0"/>
+              <a:t>++	algorithm_cpp/radix.cpp</a:t>
+            </a:r>
+            <a:endParaRPr lang="it-IT" dirty="0"/>
+          </a:p>
+        </p:txBody>
+      </p:sp>
       <p:pic>
         <p:nvPicPr>
-          <p:cNvPr id="20" name="Immagine 19"/>
+          <p:cNvPr id="7" name="Immagine 6"/>
           <p:cNvPicPr>
             <a:picLocks noChangeAspect="1"/>
           </p:cNvPicPr>
           <p:nvPr/>
         </p:nvPicPr>
-        <p:blipFill rotWithShape="1">
+        <p:blipFill>
           <a:blip r:embed="rId2"/>
-          <a:srcRect t="9656"/>
-          <a:stretch/>
+          <a:stretch>
+            <a:fillRect/>
+          </a:stretch>
         </p:blipFill>
         <p:spPr>
           <a:xfrm>
-            <a:off x="1082548" y="2586101"/>
-            <a:ext cx="4955198" cy="4257675"/>
+            <a:off x="1069848" y="2613025"/>
+            <a:ext cx="4707128" cy="3416030"/>
           </a:xfrm>
           <a:prstGeom prst="rect">
             <a:avLst/>
           </a:prstGeom>
         </p:spPr>
       </p:pic>
-      <p:sp>
-        <p:nvSpPr>
-          <p:cNvPr id="2" name="Titolo 1"/>
-          <p:cNvSpPr>
-            <a:spLocks noGrp="1"/>
-          </p:cNvSpPr>
-          <p:nvPr>
-            <p:ph type="title"/>
-          </p:nvPr>
-        </p:nvSpPr>
-        <p:spPr/>
-        <p:txBody>
-          <a:bodyPr/>
-          <a:lstStyle/>
-          <a:p>
-            <a:r>
-              <a:rPr lang="it-IT" cap="none" dirty="0" err="1" smtClean="0"/>
-              <a:t>countingsort</a:t>
-            </a:r>
-            <a:r>
-              <a:rPr lang="it-IT" cap="none" dirty="0" smtClean="0">
-                <a:latin typeface="Adobe Fan Heiti Std B" panose="020B0700000000000000" pitchFamily="34" charset="-128"/>
-                <a:ea typeface="Adobe Fan Heiti Std B" panose="020B0700000000000000" pitchFamily="34" charset="-128"/>
-              </a:rPr>
-              <a:t>() [1/3]</a:t>
-            </a:r>
-            <a:endParaRPr lang="it-IT" cap="none" dirty="0"/>
-          </a:p>
-        </p:txBody>
-      </p:sp>
-      <p:sp>
-        <p:nvSpPr>
-          <p:cNvPr id="3" name="Segnaposto contenuto 2"/>
-          <p:cNvSpPr>
-            <a:spLocks noGrp="1"/>
-          </p:cNvSpPr>
-          <p:nvPr>
-            <p:ph idx="1"/>
-          </p:nvPr>
-        </p:nvSpPr>
-        <p:spPr>
-          <a:xfrm>
-            <a:off x="1069848" y="2205609"/>
-            <a:ext cx="860552" cy="380492"/>
-          </a:xfrm>
-        </p:spPr>
-        <p:txBody>
-          <a:bodyPr/>
-          <a:lstStyle/>
-          <a:p>
-            <a:pPr marL="0" indent="0">
-              <a:buNone/>
-            </a:pPr>
-            <a:r>
-              <a:rPr lang="it-IT" dirty="0" smtClean="0"/>
-              <a:t>C++</a:t>
-            </a:r>
-            <a:endParaRPr lang="it-IT" dirty="0"/>
-          </a:p>
-        </p:txBody>
-      </p:sp>
-      <p:sp>
-        <p:nvSpPr>
-          <p:cNvPr id="9" name="CasellaDiTesto 8"/>
-          <p:cNvSpPr txBox="1"/>
-          <p:nvPr/>
-        </p:nvSpPr>
-        <p:spPr>
-          <a:xfrm>
-            <a:off x="6822249" y="889194"/>
-            <a:ext cx="1024639" cy="400110"/>
-          </a:xfrm>
-          <a:prstGeom prst="rect">
-            <a:avLst/>
-          </a:prstGeom>
-          <a:noFill/>
-        </p:spPr>
-        <p:txBody>
-          <a:bodyPr wrap="none" rtlCol="0">
-            <a:spAutoFit/>
-          </a:bodyPr>
-          <a:lstStyle/>
-          <a:p>
-            <a:r>
-              <a:rPr lang="it-IT" sz="2000" dirty="0" smtClean="0"/>
-              <a:t>RISC-V</a:t>
-            </a:r>
-            <a:endParaRPr lang="it-IT" dirty="0"/>
-          </a:p>
-        </p:txBody>
-      </p:sp>
       <p:pic>
         <p:nvPicPr>
-          <p:cNvPr id="5" name="Immagine 4"/>
+          <p:cNvPr id="8" name="Immagine 7"/>
           <p:cNvPicPr>
             <a:picLocks noChangeAspect="1"/>
           </p:cNvPicPr>
           <p:nvPr/>
         </p:nvPicPr>
-        <p:blipFill rotWithShape="1">
+        <p:blipFill>
           <a:blip r:embed="rId3"/>
-          <a:srcRect b="48372"/>
-          <a:stretch/>
+          <a:stretch>
+            <a:fillRect/>
+          </a:stretch>
         </p:blipFill>
         <p:spPr>
           <a:xfrm>
-            <a:off x="6822249" y="1289304"/>
-            <a:ext cx="5014152" cy="4826909"/>
+            <a:off x="6822249" y="819150"/>
+            <a:ext cx="3590925" cy="5829300"/>
           </a:xfrm>
           <a:prstGeom prst="rect">
             <a:avLst/>
           </a:prstGeom>
         </p:spPr>
       </p:pic>
+      <p:sp>
+        <p:nvSpPr>
+          <p:cNvPr id="9" name="CasellaDiTesto 8"/>
+          <p:cNvSpPr txBox="1"/>
+          <p:nvPr/>
+        </p:nvSpPr>
+        <p:spPr>
+          <a:xfrm>
+            <a:off x="6822249" y="324350"/>
+            <a:ext cx="4531551" cy="400110"/>
+          </a:xfrm>
+          <a:prstGeom prst="rect">
+            <a:avLst/>
+          </a:prstGeom>
+          <a:noFill/>
+        </p:spPr>
+        <p:txBody>
+          <a:bodyPr wrap="square" rtlCol="0">
+            <a:spAutoFit/>
+          </a:bodyPr>
+          <a:lstStyle/>
+          <a:p>
+            <a:r>
+              <a:rPr lang="it-IT" sz="2000" dirty="0" smtClean="0"/>
+              <a:t>RISC-V		</a:t>
+            </a:r>
+            <a:r>
+              <a:rPr lang="it-IT" sz="2000" dirty="0" err="1" smtClean="0"/>
+              <a:t>src</a:t>
+            </a:r>
+            <a:r>
+              <a:rPr lang="it-IT" sz="2000" dirty="0" smtClean="0"/>
+              <a:t>/</a:t>
+            </a:r>
+            <a:r>
+              <a:rPr lang="it-IT" sz="2000" dirty="0" err="1" smtClean="0"/>
+              <a:t>radixsort.s</a:t>
+            </a:r>
+            <a:endParaRPr lang="it-IT" dirty="0"/>
+          </a:p>
+        </p:txBody>
+      </p:sp>
       <p:cxnSp>
         <p:nvCxnSpPr>
-          <p:cNvPr id="13" name="Connettore 4 12"/>
+          <p:cNvPr id="11" name="Connettore 4 10"/>
           <p:cNvCxnSpPr/>
           <p:nvPr/>
         </p:nvCxnSpPr>
         <p:spPr>
           <a:xfrm flipV="1">
-            <a:off x="3349487" y="2176670"/>
-            <a:ext cx="3468756" cy="1490869"/>
+            <a:off x="4295775" y="1447800"/>
+            <a:ext cx="2526474" cy="2352675"/>
           </a:xfrm>
           <a:prstGeom prst="bentConnector3">
             <a:avLst>
-              <a:gd name="adj1" fmla="val 52579"/>
+              <a:gd name="adj1" fmla="val 37936"/>
             </a:avLst>
           </a:prstGeom>
           <a:ln>
@@ -5224,18 +5600,23 @@
       </p:cxnSp>
       <p:cxnSp>
         <p:nvCxnSpPr>
-          <p:cNvPr id="17" name="Connettore 1 16"/>
+          <p:cNvPr id="26" name="Connettore 4 25"/>
           <p:cNvCxnSpPr/>
           <p:nvPr/>
         </p:nvCxnSpPr>
         <p:spPr>
-          <a:xfrm>
-            <a:off x="7086600" y="3279913"/>
-            <a:ext cx="0" cy="1938130"/>
-          </a:xfrm>
-          <a:prstGeom prst="line">
-            <a:avLst/>
+          <a:xfrm flipV="1">
+            <a:off x="4495800" y="4552950"/>
+            <a:ext cx="2326449" cy="1028700"/>
+          </a:xfrm>
+          <a:prstGeom prst="bentConnector3">
+            <a:avLst>
+              <a:gd name="adj1" fmla="val 87257"/>
+            </a:avLst>
           </a:prstGeom>
+          <a:ln>
+            <a:tailEnd type="triangle"/>
+          </a:ln>
         </p:spPr>
         <p:style>
           <a:lnRef idx="1">
@@ -5254,17 +5635,19 @@
       </p:cxnSp>
       <p:cxnSp>
         <p:nvCxnSpPr>
-          <p:cNvPr id="19" name="Connettore 2 18"/>
+          <p:cNvPr id="29" name="Connettore 4 28"/>
           <p:cNvCxnSpPr/>
           <p:nvPr/>
         </p:nvCxnSpPr>
         <p:spPr>
-          <a:xfrm>
-            <a:off x="4067175" y="3895725"/>
-            <a:ext cx="2943225" cy="0"/>
-          </a:xfrm>
-          <a:prstGeom prst="straightConnector1">
-            <a:avLst/>
+          <a:xfrm rot="5400000" flipH="1" flipV="1">
+            <a:off x="5431282" y="3945384"/>
+            <a:ext cx="1743837" cy="1052449"/>
+          </a:xfrm>
+          <a:prstGeom prst="bentConnector3">
+            <a:avLst>
+              <a:gd name="adj1" fmla="val 100251"/>
+            </a:avLst>
           </a:prstGeom>
           <a:ln>
             <a:tailEnd type="triangle"/>
@@ -5288,7 +5671,7 @@
     </p:spTree>
     <p:extLst>
       <p:ext uri="{BB962C8B-B14F-4D97-AF65-F5344CB8AC3E}">
-        <p14:creationId xmlns:p14="http://schemas.microsoft.com/office/powerpoint/2010/main" val="2397505655"/>
+        <p14:creationId xmlns:p14="http://schemas.microsoft.com/office/powerpoint/2010/main" val="3151084631"/>
       </p:ext>
     </p:extLst>
   </p:cSld>
@@ -5324,7 +5707,7 @@
       </p:grpSpPr>
       <p:pic>
         <p:nvPicPr>
-          <p:cNvPr id="26" name="Immagine 25"/>
+          <p:cNvPr id="20" name="Immagine 19"/>
           <p:cNvPicPr>
             <a:picLocks noChangeAspect="1"/>
           </p:cNvPicPr>
@@ -5369,7 +5752,7 @@
                 <a:latin typeface="Adobe Fan Heiti Std B" panose="020B0700000000000000" pitchFamily="34" charset="-128"/>
                 <a:ea typeface="Adobe Fan Heiti Std B" panose="020B0700000000000000" pitchFamily="34" charset="-128"/>
               </a:rPr>
-              <a:t>() [2/3]</a:t>
+              <a:t>() [1/3]</a:t>
             </a:r>
             <a:endParaRPr lang="it-IT" cap="none" dirty="0"/>
           </a:p>
@@ -5387,12 +5770,14 @@
         </p:nvSpPr>
         <p:spPr>
           <a:xfrm>
-            <a:off x="1069848" y="2205609"/>
-            <a:ext cx="860552" cy="380492"/>
-          </a:xfrm>
-        </p:spPr>
-        <p:txBody>
-          <a:bodyPr/>
+            <a:off x="1069847" y="2205609"/>
+            <a:ext cx="5748395" cy="380492"/>
+          </a:xfrm>
+        </p:spPr>
+        <p:txBody>
+          <a:bodyPr>
+            <a:normAutofit/>
+          </a:bodyPr>
           <a:lstStyle/>
           <a:p>
             <a:pPr marL="0" indent="0">
@@ -5400,7 +5785,11 @@
             </a:pPr>
             <a:r>
               <a:rPr lang="it-IT" dirty="0" smtClean="0"/>
-              <a:t>C++</a:t>
+              <a:t>C</a:t>
+            </a:r>
+            <a:r>
+              <a:rPr lang="it-IT" dirty="0"/>
+              <a:t>++	algorithm_cpp/radix.cpp</a:t>
             </a:r>
             <a:endParaRPr lang="it-IT" dirty="0"/>
           </a:p>
@@ -5408,14 +5797,14 @@
       </p:sp>
       <p:sp>
         <p:nvSpPr>
-          <p:cNvPr id="7" name="CasellaDiTesto 6"/>
+          <p:cNvPr id="9" name="CasellaDiTesto 8"/>
           <p:cNvSpPr txBox="1"/>
           <p:nvPr/>
         </p:nvSpPr>
         <p:spPr>
           <a:xfrm>
-            <a:off x="6822249" y="1289304"/>
-            <a:ext cx="1024639" cy="400110"/>
+            <a:off x="6822249" y="889194"/>
+            <a:ext cx="3706527" cy="400110"/>
           </a:xfrm>
           <a:prstGeom prst="rect">
             <a:avLst/>
@@ -5430,7 +5819,19 @@
           <a:p>
             <a:r>
               <a:rPr lang="it-IT" sz="2000" dirty="0" smtClean="0"/>
-              <a:t>RISC-V</a:t>
+              <a:t>RISC-V		</a:t>
+            </a:r>
+            <a:r>
+              <a:rPr lang="it-IT" sz="2000" dirty="0" err="1" smtClean="0"/>
+              <a:t>src</a:t>
+            </a:r>
+            <a:r>
+              <a:rPr lang="it-IT" sz="2000" dirty="0" smtClean="0"/>
+              <a:t>/</a:t>
+            </a:r>
+            <a:r>
+              <a:rPr lang="it-IT" sz="2000" dirty="0" err="1" smtClean="0"/>
+              <a:t>countingsort.s</a:t>
             </a:r>
             <a:endParaRPr lang="it-IT" dirty="0"/>
           </a:p>
@@ -5438,7 +5839,7 @@
       </p:sp>
       <p:pic>
         <p:nvPicPr>
-          <p:cNvPr id="8" name="Immagine 7"/>
+          <p:cNvPr id="5" name="Immagine 4"/>
           <p:cNvPicPr>
             <a:picLocks noChangeAspect="1"/>
           </p:cNvPicPr>
@@ -5446,13 +5847,13 @@
         </p:nvPicPr>
         <p:blipFill rotWithShape="1">
           <a:blip r:embed="rId3"/>
-          <a:srcRect t="52298" b="-314"/>
+          <a:srcRect b="48372"/>
           <a:stretch/>
         </p:blipFill>
         <p:spPr>
           <a:xfrm>
-            <a:off x="6822249" y="1689414"/>
-            <a:ext cx="5014152" cy="4489196"/>
+            <a:off x="6822249" y="1289304"/>
+            <a:ext cx="5014152" cy="4826909"/>
           </a:xfrm>
           <a:prstGeom prst="rect">
             <a:avLst/>
@@ -5461,18 +5862,18 @@
       </p:pic>
       <p:cxnSp>
         <p:nvCxnSpPr>
-          <p:cNvPr id="10" name="Connettore 4 9"/>
+          <p:cNvPr id="13" name="Connettore 4 12"/>
           <p:cNvCxnSpPr/>
           <p:nvPr/>
         </p:nvCxnSpPr>
         <p:spPr>
           <a:xfrm flipV="1">
-            <a:off x="3468757" y="2454965"/>
-            <a:ext cx="3353492" cy="1997765"/>
+            <a:off x="3349487" y="2176670"/>
+            <a:ext cx="3468756" cy="1490869"/>
           </a:xfrm>
           <a:prstGeom prst="bentConnector3">
             <a:avLst>
-              <a:gd name="adj1" fmla="val 72821"/>
+              <a:gd name="adj1" fmla="val 52579"/>
             </a:avLst>
           </a:prstGeom>
           <a:ln>
@@ -5496,21 +5897,18 @@
       </p:cxnSp>
       <p:cxnSp>
         <p:nvCxnSpPr>
-          <p:cNvPr id="13" name="Connettore 4 12"/>
+          <p:cNvPr id="17" name="Connettore 1 16"/>
           <p:cNvCxnSpPr/>
           <p:nvPr/>
         </p:nvCxnSpPr>
         <p:spPr>
           <a:xfrm>
-            <a:off x="3866322" y="4691270"/>
-            <a:ext cx="3130826" cy="149087"/>
-          </a:xfrm>
-          <a:prstGeom prst="bentConnector3">
+            <a:off x="7086600" y="3279913"/>
+            <a:ext cx="0" cy="1938130"/>
+          </a:xfrm>
+          <a:prstGeom prst="line">
             <a:avLst/>
           </a:prstGeom>
-          <a:ln>
-            <a:tailEnd type="triangle"/>
-          </a:ln>
         </p:spPr>
         <p:style>
           <a:lnRef idx="1">
@@ -5529,79 +5927,17 @@
       </p:cxnSp>
       <p:cxnSp>
         <p:nvCxnSpPr>
-          <p:cNvPr id="16" name="Connettore 1 15"/>
+          <p:cNvPr id="19" name="Connettore 2 18"/>
           <p:cNvCxnSpPr/>
           <p:nvPr/>
         </p:nvCxnSpPr>
         <p:spPr>
           <a:xfrm>
-            <a:off x="7076661" y="4591878"/>
-            <a:ext cx="0" cy="477079"/>
-          </a:xfrm>
-          <a:prstGeom prst="line">
+            <a:off x="4067175" y="3895725"/>
+            <a:ext cx="2943225" cy="0"/>
+          </a:xfrm>
+          <a:prstGeom prst="straightConnector1">
             <a:avLst/>
-          </a:prstGeom>
-        </p:spPr>
-        <p:style>
-          <a:lnRef idx="1">
-            <a:schemeClr val="accent1"/>
-          </a:lnRef>
-          <a:fillRef idx="0">
-            <a:schemeClr val="accent1"/>
-          </a:fillRef>
-          <a:effectRef idx="0">
-            <a:schemeClr val="accent1"/>
-          </a:effectRef>
-          <a:fontRef idx="minor">
-            <a:schemeClr val="tx1"/>
-          </a:fontRef>
-        </p:style>
-      </p:cxnSp>
-      <p:cxnSp>
-        <p:nvCxnSpPr>
-          <p:cNvPr id="18" name="Connettore 1 17"/>
-          <p:cNvCxnSpPr/>
-          <p:nvPr/>
-        </p:nvCxnSpPr>
-        <p:spPr>
-          <a:xfrm>
-            <a:off x="7076661" y="3568148"/>
-            <a:ext cx="0" cy="139148"/>
-          </a:xfrm>
-          <a:prstGeom prst="line">
-            <a:avLst/>
-          </a:prstGeom>
-        </p:spPr>
-        <p:style>
-          <a:lnRef idx="1">
-            <a:schemeClr val="accent1"/>
-          </a:lnRef>
-          <a:fillRef idx="0">
-            <a:schemeClr val="accent1"/>
-          </a:fillRef>
-          <a:effectRef idx="0">
-            <a:schemeClr val="accent1"/>
-          </a:effectRef>
-          <a:fontRef idx="minor">
-            <a:schemeClr val="tx1"/>
-          </a:fontRef>
-        </p:style>
-      </p:cxnSp>
-      <p:cxnSp>
-        <p:nvCxnSpPr>
-          <p:cNvPr id="20" name="Connettore 4 19"/>
-          <p:cNvCxnSpPr/>
-          <p:nvPr/>
-        </p:nvCxnSpPr>
-        <p:spPr>
-          <a:xfrm rot="5400000" flipH="1" flipV="1">
-            <a:off x="6044908" y="3917725"/>
-            <a:ext cx="1208952" cy="636314"/>
-          </a:xfrm>
-          <a:prstGeom prst="bentConnector3">
-            <a:avLst>
-              <a:gd name="adj1" fmla="val 99833"/>
-            </a:avLst>
           </a:prstGeom>
           <a:ln>
             <a:tailEnd type="triangle"/>
@@ -5625,7 +5961,7 @@
     </p:spTree>
     <p:extLst>
       <p:ext uri="{BB962C8B-B14F-4D97-AF65-F5344CB8AC3E}">
-        <p14:creationId xmlns:p14="http://schemas.microsoft.com/office/powerpoint/2010/main" val="3308911331"/>
+        <p14:creationId xmlns:p14="http://schemas.microsoft.com/office/powerpoint/2010/main" val="2397505655"/>
       </p:ext>
     </p:extLst>
   </p:cSld>
@@ -5659,100 +5995,9 @@
           <a:chExt cx="0" cy="0"/>
         </a:xfrm>
       </p:grpSpPr>
-      <p:sp>
-        <p:nvSpPr>
-          <p:cNvPr id="2" name="Titolo 1"/>
-          <p:cNvSpPr>
-            <a:spLocks noGrp="1"/>
-          </p:cNvSpPr>
-          <p:nvPr>
-            <p:ph type="title"/>
-          </p:nvPr>
-        </p:nvSpPr>
-        <p:spPr/>
-        <p:txBody>
-          <a:bodyPr/>
-          <a:lstStyle/>
-          <a:p>
-            <a:r>
-              <a:rPr lang="it-IT" cap="none" dirty="0" err="1" smtClean="0"/>
-              <a:t>countingsort</a:t>
-            </a:r>
-            <a:r>
-              <a:rPr lang="it-IT" cap="none" dirty="0" smtClean="0">
-                <a:latin typeface="Adobe Fan Heiti Std B" panose="020B0700000000000000" pitchFamily="34" charset="-128"/>
-                <a:ea typeface="Adobe Fan Heiti Std B" panose="020B0700000000000000" pitchFamily="34" charset="-128"/>
-              </a:rPr>
-              <a:t>() [3/3]</a:t>
-            </a:r>
-            <a:endParaRPr lang="it-IT" cap="none" dirty="0"/>
-          </a:p>
-        </p:txBody>
-      </p:sp>
-      <p:sp>
-        <p:nvSpPr>
-          <p:cNvPr id="3" name="Segnaposto contenuto 2"/>
-          <p:cNvSpPr>
-            <a:spLocks noGrp="1"/>
-          </p:cNvSpPr>
-          <p:nvPr>
-            <p:ph idx="1"/>
-          </p:nvPr>
-        </p:nvSpPr>
-        <p:spPr>
-          <a:xfrm>
-            <a:off x="1069848" y="2205609"/>
-            <a:ext cx="860552" cy="380492"/>
-          </a:xfrm>
-        </p:spPr>
-        <p:txBody>
-          <a:bodyPr/>
-          <a:lstStyle/>
-          <a:p>
-            <a:pPr marL="0" indent="0">
-              <a:buNone/>
-            </a:pPr>
-            <a:r>
-              <a:rPr lang="it-IT" dirty="0" smtClean="0"/>
-              <a:t>C++</a:t>
-            </a:r>
-            <a:endParaRPr lang="it-IT" dirty="0"/>
-          </a:p>
-        </p:txBody>
-      </p:sp>
-      <p:sp>
-        <p:nvSpPr>
-          <p:cNvPr id="9" name="CasellaDiTesto 8"/>
-          <p:cNvSpPr txBox="1"/>
-          <p:nvPr/>
-        </p:nvSpPr>
-        <p:spPr>
-          <a:xfrm>
-            <a:off x="6822249" y="324350"/>
-            <a:ext cx="1024639" cy="400110"/>
-          </a:xfrm>
-          <a:prstGeom prst="rect">
-            <a:avLst/>
-          </a:prstGeom>
-          <a:noFill/>
-        </p:spPr>
-        <p:txBody>
-          <a:bodyPr wrap="none" rtlCol="0">
-            <a:spAutoFit/>
-          </a:bodyPr>
-          <a:lstStyle/>
-          <a:p>
-            <a:r>
-              <a:rPr lang="it-IT" sz="2000" dirty="0" smtClean="0"/>
-              <a:t>RISC-V</a:t>
-            </a:r>
-            <a:endParaRPr lang="it-IT" dirty="0"/>
-          </a:p>
-        </p:txBody>
-      </p:sp>
       <p:pic>
         <p:nvPicPr>
-          <p:cNvPr id="6" name="Immagine 5"/>
+          <p:cNvPr id="26" name="Immagine 25"/>
           <p:cNvPicPr>
             <a:picLocks noChangeAspect="1"/>
           </p:cNvPicPr>
@@ -5760,19 +6005,124 @@
         </p:nvPicPr>
         <p:blipFill rotWithShape="1">
           <a:blip r:embed="rId2"/>
-          <a:srcRect t="14592" b="9126"/>
+          <a:srcRect t="9656"/>
           <a:stretch/>
         </p:blipFill>
         <p:spPr>
           <a:xfrm>
-            <a:off x="6822249" y="724460"/>
-            <a:ext cx="4976831" cy="5117540"/>
+            <a:off x="1082548" y="2586101"/>
+            <a:ext cx="4955198" cy="4257675"/>
           </a:xfrm>
           <a:prstGeom prst="rect">
             <a:avLst/>
           </a:prstGeom>
         </p:spPr>
       </p:pic>
+      <p:sp>
+        <p:nvSpPr>
+          <p:cNvPr id="2" name="Titolo 1"/>
+          <p:cNvSpPr>
+            <a:spLocks noGrp="1"/>
+          </p:cNvSpPr>
+          <p:nvPr>
+            <p:ph type="title"/>
+          </p:nvPr>
+        </p:nvSpPr>
+        <p:spPr/>
+        <p:txBody>
+          <a:bodyPr/>
+          <a:lstStyle/>
+          <a:p>
+            <a:r>
+              <a:rPr lang="it-IT" cap="none" dirty="0" err="1" smtClean="0"/>
+              <a:t>countingsort</a:t>
+            </a:r>
+            <a:r>
+              <a:rPr lang="it-IT" cap="none" dirty="0" smtClean="0">
+                <a:latin typeface="Adobe Fan Heiti Std B" panose="020B0700000000000000" pitchFamily="34" charset="-128"/>
+                <a:ea typeface="Adobe Fan Heiti Std B" panose="020B0700000000000000" pitchFamily="34" charset="-128"/>
+              </a:rPr>
+              <a:t>() [2/3]</a:t>
+            </a:r>
+            <a:endParaRPr lang="it-IT" cap="none" dirty="0"/>
+          </a:p>
+        </p:txBody>
+      </p:sp>
+      <p:sp>
+        <p:nvSpPr>
+          <p:cNvPr id="3" name="Segnaposto contenuto 2"/>
+          <p:cNvSpPr>
+            <a:spLocks noGrp="1"/>
+          </p:cNvSpPr>
+          <p:nvPr>
+            <p:ph idx="1"/>
+          </p:nvPr>
+        </p:nvSpPr>
+        <p:spPr>
+          <a:xfrm>
+            <a:off x="1069848" y="2205609"/>
+            <a:ext cx="4772152" cy="380492"/>
+          </a:xfrm>
+        </p:spPr>
+        <p:txBody>
+          <a:bodyPr>
+            <a:normAutofit/>
+          </a:bodyPr>
+          <a:lstStyle/>
+          <a:p>
+            <a:pPr marL="0" indent="0">
+              <a:buNone/>
+            </a:pPr>
+            <a:r>
+              <a:rPr lang="it-IT" dirty="0"/>
+              <a:t>C++	algorithm_cpp/radix.cpp</a:t>
+            </a:r>
+            <a:endParaRPr lang="it-IT" dirty="0"/>
+          </a:p>
+        </p:txBody>
+      </p:sp>
+      <p:sp>
+        <p:nvSpPr>
+          <p:cNvPr id="7" name="CasellaDiTesto 6"/>
+          <p:cNvSpPr txBox="1"/>
+          <p:nvPr/>
+        </p:nvSpPr>
+        <p:spPr>
+          <a:xfrm>
+            <a:off x="6822249" y="1289304"/>
+            <a:ext cx="3706527" cy="400110"/>
+          </a:xfrm>
+          <a:prstGeom prst="rect">
+            <a:avLst/>
+          </a:prstGeom>
+          <a:noFill/>
+        </p:spPr>
+        <p:txBody>
+          <a:bodyPr wrap="none" rtlCol="0">
+            <a:spAutoFit/>
+          </a:bodyPr>
+          <a:lstStyle/>
+          <a:p>
+            <a:r>
+              <a:rPr lang="it-IT" sz="2000" dirty="0" smtClean="0"/>
+              <a:t>RISC-V		</a:t>
+            </a:r>
+            <a:r>
+              <a:rPr lang="it-IT" sz="2000" dirty="0" err="1" smtClean="0"/>
+              <a:t>src</a:t>
+            </a:r>
+            <a:r>
+              <a:rPr lang="it-IT" sz="2000" dirty="0" smtClean="0"/>
+              <a:t>/</a:t>
+            </a:r>
+            <a:r>
+              <a:rPr lang="it-IT" sz="2000" dirty="0" err="1" smtClean="0"/>
+              <a:t>countingsort.s</a:t>
+            </a:r>
+            <a:endParaRPr lang="it-IT" dirty="0"/>
+          </a:p>
+        </p:txBody>
+      </p:sp>
       <p:pic>
         <p:nvPicPr>
           <p:cNvPr id="8" name="Immagine 7"/>
@@ -5782,14 +6132,14 @@
           <p:nvPr/>
         </p:nvPicPr>
         <p:blipFill rotWithShape="1">
-          <a:blip r:embed="rId2"/>
-          <a:srcRect t="90306" r="18644"/>
+          <a:blip r:embed="rId3"/>
+          <a:srcRect t="52298" b="-314"/>
           <a:stretch/>
         </p:blipFill>
         <p:spPr>
           <a:xfrm>
-            <a:off x="6822249" y="5803900"/>
-            <a:ext cx="4048951" cy="650328"/>
+            <a:off x="6822249" y="1689414"/>
+            <a:ext cx="5014152" cy="4489196"/>
           </a:xfrm>
           <a:prstGeom prst="rect">
             <a:avLst/>
@@ -5798,18 +6148,23 @@
       </p:pic>
       <p:cxnSp>
         <p:nvCxnSpPr>
-          <p:cNvPr id="14" name="Connettore 1 13"/>
+          <p:cNvPr id="10" name="Connettore 4 9"/>
           <p:cNvCxnSpPr/>
           <p:nvPr/>
         </p:nvCxnSpPr>
         <p:spPr>
           <a:xfrm flipV="1">
-            <a:off x="6029325" y="1028700"/>
-            <a:ext cx="0" cy="4029075"/>
-          </a:xfrm>
-          <a:prstGeom prst="line">
-            <a:avLst/>
+            <a:off x="3468757" y="2454965"/>
+            <a:ext cx="3353492" cy="1997765"/>
+          </a:xfrm>
+          <a:prstGeom prst="bentConnector3">
+            <a:avLst>
+              <a:gd name="adj1" fmla="val 72821"/>
+            </a:avLst>
           </a:prstGeom>
+          <a:ln>
+            <a:tailEnd type="triangle"/>
+          </a:ln>
         </p:spPr>
         <p:style>
           <a:lnRef idx="1">
@@ -5828,74 +6183,21 @@
       </p:cxnSp>
       <p:cxnSp>
         <p:nvCxnSpPr>
-          <p:cNvPr id="18" name="Connettore 2 17"/>
+          <p:cNvPr id="13" name="Connettore 4 12"/>
           <p:cNvCxnSpPr/>
           <p:nvPr/>
         </p:nvCxnSpPr>
         <p:spPr>
           <a:xfrm>
-            <a:off x="6029325" y="1027908"/>
-            <a:ext cx="792924" cy="0"/>
-          </a:xfrm>
-          <a:prstGeom prst="straightConnector1">
+            <a:off x="3866322" y="4691270"/>
+            <a:ext cx="3130826" cy="149087"/>
+          </a:xfrm>
+          <a:prstGeom prst="bentConnector3">
             <a:avLst/>
           </a:prstGeom>
           <a:ln>
             <a:tailEnd type="triangle"/>
           </a:ln>
-        </p:spPr>
-        <p:style>
-          <a:lnRef idx="1">
-            <a:schemeClr val="accent1"/>
-          </a:lnRef>
-          <a:fillRef idx="0">
-            <a:schemeClr val="accent1"/>
-          </a:fillRef>
-          <a:effectRef idx="0">
-            <a:schemeClr val="accent1"/>
-          </a:effectRef>
-          <a:fontRef idx="minor">
-            <a:schemeClr val="tx1"/>
-          </a:fontRef>
-        </p:style>
-      </p:cxnSp>
-      <p:pic>
-        <p:nvPicPr>
-          <p:cNvPr id="19" name="Immagine 18"/>
-          <p:cNvPicPr>
-            <a:picLocks noChangeAspect="1"/>
-          </p:cNvPicPr>
-          <p:nvPr/>
-        </p:nvPicPr>
-        <p:blipFill rotWithShape="1">
-          <a:blip r:embed="rId3"/>
-          <a:srcRect t="9656"/>
-          <a:stretch/>
-        </p:blipFill>
-        <p:spPr>
-          <a:xfrm>
-            <a:off x="1074127" y="2586101"/>
-            <a:ext cx="4955198" cy="4257675"/>
-          </a:xfrm>
-          <a:prstGeom prst="rect">
-            <a:avLst/>
-          </a:prstGeom>
-        </p:spPr>
-      </p:pic>
-      <p:cxnSp>
-        <p:nvCxnSpPr>
-          <p:cNvPr id="12" name="Connettore 1 11"/>
-          <p:cNvCxnSpPr/>
-          <p:nvPr/>
-        </p:nvCxnSpPr>
-        <p:spPr>
-          <a:xfrm>
-            <a:off x="3924300" y="5057775"/>
-            <a:ext cx="2105025" cy="0"/>
-          </a:xfrm>
-          <a:prstGeom prst="line">
-            <a:avLst/>
-          </a:prstGeom>
         </p:spPr>
         <p:style>
           <a:lnRef idx="1">
@@ -5914,21 +6216,18 @@
       </p:cxnSp>
       <p:cxnSp>
         <p:nvCxnSpPr>
-          <p:cNvPr id="21" name="Connettore 2 20"/>
+          <p:cNvPr id="16" name="Connettore 1 15"/>
           <p:cNvCxnSpPr/>
           <p:nvPr/>
         </p:nvCxnSpPr>
         <p:spPr>
           <a:xfrm>
-            <a:off x="5257800" y="5486400"/>
-            <a:ext cx="1790700" cy="0"/>
-          </a:xfrm>
-          <a:prstGeom prst="straightConnector1">
+            <a:off x="7076661" y="4591878"/>
+            <a:ext cx="0" cy="477079"/>
+          </a:xfrm>
+          <a:prstGeom prst="line">
             <a:avLst/>
           </a:prstGeom>
-          <a:ln>
-            <a:tailEnd type="triangle"/>
-          </a:ln>
         </p:spPr>
         <p:style>
           <a:lnRef idx="1">
@@ -5947,14 +6246,14 @@
       </p:cxnSp>
       <p:cxnSp>
         <p:nvCxnSpPr>
-          <p:cNvPr id="23" name="Connettore 1 22"/>
+          <p:cNvPr id="18" name="Connettore 1 17"/>
           <p:cNvCxnSpPr/>
           <p:nvPr/>
         </p:nvCxnSpPr>
         <p:spPr>
           <a:xfrm>
-            <a:off x="7099300" y="5057775"/>
-            <a:ext cx="0" cy="581025"/>
+            <a:off x="7076661" y="3568148"/>
+            <a:ext cx="0" cy="139148"/>
           </a:xfrm>
           <a:prstGeom prst="line">
             <a:avLst/>
@@ -5977,53 +6276,23 @@
       </p:cxnSp>
       <p:cxnSp>
         <p:nvCxnSpPr>
-          <p:cNvPr id="27" name="Connettore 4 26"/>
+          <p:cNvPr id="20" name="Connettore 4 19"/>
           <p:cNvCxnSpPr/>
           <p:nvPr/>
         </p:nvCxnSpPr>
         <p:spPr>
-          <a:xfrm flipV="1">
-            <a:off x="3924299" y="3390900"/>
-            <a:ext cx="3124201" cy="1906704"/>
+          <a:xfrm rot="5400000" flipH="1" flipV="1">
+            <a:off x="6044908" y="3917725"/>
+            <a:ext cx="1208952" cy="636314"/>
           </a:xfrm>
           <a:prstGeom prst="bentConnector3">
             <a:avLst>
-              <a:gd name="adj1" fmla="val 79268"/>
+              <a:gd name="adj1" fmla="val 99833"/>
             </a:avLst>
           </a:prstGeom>
           <a:ln>
             <a:tailEnd type="triangle"/>
           </a:ln>
-        </p:spPr>
-        <p:style>
-          <a:lnRef idx="1">
-            <a:schemeClr val="accent1"/>
-          </a:lnRef>
-          <a:fillRef idx="0">
-            <a:schemeClr val="accent1"/>
-          </a:fillRef>
-          <a:effectRef idx="0">
-            <a:schemeClr val="accent1"/>
-          </a:effectRef>
-          <a:fontRef idx="minor">
-            <a:schemeClr val="tx1"/>
-          </a:fontRef>
-        </p:style>
-      </p:cxnSp>
-      <p:cxnSp>
-        <p:nvCxnSpPr>
-          <p:cNvPr id="34" name="Connettore 1 33"/>
-          <p:cNvCxnSpPr/>
-          <p:nvPr/>
-        </p:nvCxnSpPr>
-        <p:spPr>
-          <a:xfrm>
-            <a:off x="7099300" y="2205609"/>
-            <a:ext cx="0" cy="1864741"/>
-          </a:xfrm>
-          <a:prstGeom prst="line">
-            <a:avLst/>
-          </a:prstGeom>
         </p:spPr>
         <p:style>
           <a:lnRef idx="1">
@@ -6043,7 +6312,7 @@
     </p:spTree>
     <p:extLst>
       <p:ext uri="{BB962C8B-B14F-4D97-AF65-F5344CB8AC3E}">
-        <p14:creationId xmlns:p14="http://schemas.microsoft.com/office/powerpoint/2010/main" val="169563731"/>
+        <p14:creationId xmlns:p14="http://schemas.microsoft.com/office/powerpoint/2010/main" val="3308911331"/>
       </p:ext>
     </p:extLst>
   </p:cSld>
@@ -6094,14 +6363,14 @@
           <a:p>
             <a:r>
               <a:rPr lang="it-IT" cap="none" dirty="0" err="1" smtClean="0"/>
-              <a:t>max</a:t>
+              <a:t>countingsort</a:t>
             </a:r>
             <a:r>
               <a:rPr lang="it-IT" cap="none" dirty="0" smtClean="0">
                 <a:latin typeface="Adobe Fan Heiti Std B" panose="020B0700000000000000" pitchFamily="34" charset="-128"/>
                 <a:ea typeface="Adobe Fan Heiti Std B" panose="020B0700000000000000" pitchFamily="34" charset="-128"/>
               </a:rPr>
-              <a:t>()</a:t>
+              <a:t>() [3/3]</a:t>
             </a:r>
             <a:endParaRPr lang="it-IT" cap="none" dirty="0"/>
           </a:p>
@@ -6120,19 +6389,21 @@
         <p:spPr>
           <a:xfrm>
             <a:off x="1069848" y="2205609"/>
-            <a:ext cx="860552" cy="380492"/>
-          </a:xfrm>
-        </p:spPr>
-        <p:txBody>
-          <a:bodyPr/>
+            <a:ext cx="4683252" cy="380492"/>
+          </a:xfrm>
+        </p:spPr>
+        <p:txBody>
+          <a:bodyPr>
+            <a:normAutofit/>
+          </a:bodyPr>
           <a:lstStyle/>
           <a:p>
             <a:pPr marL="0" indent="0">
               <a:buNone/>
             </a:pPr>
             <a:r>
-              <a:rPr lang="it-IT" dirty="0" smtClean="0"/>
-              <a:t>C++</a:t>
+              <a:rPr lang="it-IT" dirty="0"/>
+              <a:t>C++	algorithm_cpp/radix.cpp</a:t>
             </a:r>
             <a:endParaRPr lang="it-IT" dirty="0"/>
           </a:p>
@@ -6147,7 +6418,7 @@
         <p:spPr>
           <a:xfrm>
             <a:off x="6822249" y="324350"/>
-            <a:ext cx="1024639" cy="400110"/>
+            <a:ext cx="3706527" cy="400110"/>
           </a:xfrm>
           <a:prstGeom prst="rect">
             <a:avLst/>
@@ -6162,36 +6433,24 @@
           <a:p>
             <a:r>
               <a:rPr lang="it-IT" sz="2000" dirty="0" smtClean="0"/>
-              <a:t>RISC-V</a:t>
+              <a:t>RISC-V		</a:t>
+            </a:r>
+            <a:r>
+              <a:rPr lang="it-IT" sz="2000" dirty="0" err="1" smtClean="0"/>
+              <a:t>src</a:t>
+            </a:r>
+            <a:r>
+              <a:rPr lang="it-IT" sz="2000" dirty="0" smtClean="0"/>
+              <a:t>/</a:t>
+            </a:r>
+            <a:r>
+              <a:rPr lang="it-IT" sz="2000" dirty="0" err="1" smtClean="0"/>
+              <a:t>countingsort.s</a:t>
             </a:r>
             <a:endParaRPr lang="it-IT" dirty="0"/>
           </a:p>
         </p:txBody>
       </p:sp>
-      <p:pic>
-        <p:nvPicPr>
-          <p:cNvPr id="4" name="Immagine 3"/>
-          <p:cNvPicPr>
-            <a:picLocks noChangeAspect="1"/>
-          </p:cNvPicPr>
-          <p:nvPr/>
-        </p:nvPicPr>
-        <p:blipFill>
-          <a:blip r:embed="rId2"/>
-          <a:stretch>
-            <a:fillRect/>
-          </a:stretch>
-        </p:blipFill>
-        <p:spPr>
-          <a:xfrm>
-            <a:off x="1069848" y="2586101"/>
-            <a:ext cx="5301923" cy="2357858"/>
-          </a:xfrm>
-          <a:prstGeom prst="rect">
-            <a:avLst/>
-          </a:prstGeom>
-        </p:spPr>
-      </p:pic>
       <p:pic>
         <p:nvPicPr>
           <p:cNvPr id="6" name="Immagine 5"/>
@@ -6200,109 +6459,58 @@
           </p:cNvPicPr>
           <p:nvPr/>
         </p:nvPicPr>
-        <p:blipFill>
-          <a:blip r:embed="rId3"/>
-          <a:stretch>
-            <a:fillRect/>
-          </a:stretch>
+        <p:blipFill rotWithShape="1">
+          <a:blip r:embed="rId2"/>
+          <a:srcRect t="14592" b="9126"/>
+          <a:stretch/>
         </p:blipFill>
         <p:spPr>
           <a:xfrm>
-            <a:off x="6822249" y="724459"/>
-            <a:ext cx="4493451" cy="5575001"/>
+            <a:off x="6822249" y="724460"/>
+            <a:ext cx="4976831" cy="5117540"/>
           </a:xfrm>
           <a:prstGeom prst="rect">
             <a:avLst/>
           </a:prstGeom>
         </p:spPr>
       </p:pic>
+      <p:pic>
+        <p:nvPicPr>
+          <p:cNvPr id="8" name="Immagine 7"/>
+          <p:cNvPicPr>
+            <a:picLocks noChangeAspect="1"/>
+          </p:cNvPicPr>
+          <p:nvPr/>
+        </p:nvPicPr>
+        <p:blipFill rotWithShape="1">
+          <a:blip r:embed="rId2"/>
+          <a:srcRect t="90306" r="18644"/>
+          <a:stretch/>
+        </p:blipFill>
+        <p:spPr>
+          <a:xfrm>
+            <a:off x="6822249" y="5803900"/>
+            <a:ext cx="4048951" cy="650328"/>
+          </a:xfrm>
+          <a:prstGeom prst="rect">
+            <a:avLst/>
+          </a:prstGeom>
+        </p:spPr>
+      </p:pic>
       <p:cxnSp>
         <p:nvCxnSpPr>
-          <p:cNvPr id="8" name="Connettore 4 7"/>
+          <p:cNvPr id="14" name="Connettore 1 13"/>
           <p:cNvCxnSpPr/>
           <p:nvPr/>
         </p:nvCxnSpPr>
         <p:spPr>
           <a:xfrm flipV="1">
-            <a:off x="3251200" y="1917700"/>
-            <a:ext cx="3822700" cy="1574800"/>
-          </a:xfrm>
-          <a:prstGeom prst="bentConnector3">
-            <a:avLst>
-              <a:gd name="adj1" fmla="val 79900"/>
-            </a:avLst>
-          </a:prstGeom>
-          <a:ln>
-            <a:tailEnd type="triangle"/>
-          </a:ln>
-        </p:spPr>
-        <p:style>
-          <a:lnRef idx="1">
-            <a:schemeClr val="accent1"/>
-          </a:lnRef>
-          <a:fillRef idx="0">
-            <a:schemeClr val="accent1"/>
-          </a:fillRef>
-          <a:effectRef idx="0">
-            <a:schemeClr val="accent1"/>
-          </a:effectRef>
-          <a:fontRef idx="minor">
-            <a:schemeClr val="tx1"/>
-          </a:fontRef>
-        </p:style>
-      </p:cxnSp>
-      <p:cxnSp>
-        <p:nvCxnSpPr>
-          <p:cNvPr id="12" name="Connettore 4 11"/>
-          <p:cNvCxnSpPr/>
-          <p:nvPr/>
-        </p:nvCxnSpPr>
-        <p:spPr>
-          <a:xfrm flipV="1">
-            <a:off x="4368800" y="2743200"/>
-            <a:ext cx="2453449" cy="1028700"/>
-          </a:xfrm>
-          <a:prstGeom prst="bentConnector3">
-            <a:avLst>
-              <a:gd name="adj1" fmla="val 89341"/>
-            </a:avLst>
-          </a:prstGeom>
-          <a:ln>
-            <a:tailEnd type="triangle"/>
-          </a:ln>
-        </p:spPr>
-        <p:style>
-          <a:lnRef idx="1">
-            <a:schemeClr val="accent1"/>
-          </a:lnRef>
-          <a:fillRef idx="0">
-            <a:schemeClr val="accent1"/>
-          </a:fillRef>
-          <a:effectRef idx="0">
-            <a:schemeClr val="accent1"/>
-          </a:effectRef>
-          <a:fontRef idx="minor">
-            <a:schemeClr val="tx1"/>
-          </a:fontRef>
-        </p:style>
-      </p:cxnSp>
-      <p:cxnSp>
-        <p:nvCxnSpPr>
-          <p:cNvPr id="15" name="Connettore 4 14"/>
-          <p:cNvCxnSpPr/>
-          <p:nvPr/>
-        </p:nvCxnSpPr>
-        <p:spPr>
-          <a:xfrm>
-            <a:off x="3708400" y="4264025"/>
-            <a:ext cx="3365500" cy="612775"/>
-          </a:xfrm>
-          <a:prstGeom prst="bentConnector3">
+            <a:off x="6029325" y="1028700"/>
+            <a:ext cx="0" cy="4029075"/>
+          </a:xfrm>
+          <a:prstGeom prst="line">
             <a:avLst/>
           </a:prstGeom>
-          <a:ln>
-            <a:tailEnd type="triangle"/>
-          </a:ln>
         </p:spPr>
         <p:style>
           <a:lnRef idx="1">
@@ -6327,8 +6535,8 @@
         </p:nvCxnSpPr>
         <p:spPr>
           <a:xfrm>
-            <a:off x="3670300" y="4011727"/>
-            <a:ext cx="3403600" cy="0"/>
+            <a:off x="6029325" y="1027908"/>
+            <a:ext cx="792924" cy="0"/>
           </a:xfrm>
           <a:prstGeom prst="straightConnector1">
             <a:avLst/>
@@ -6336,6 +6544,59 @@
           <a:ln>
             <a:tailEnd type="triangle"/>
           </a:ln>
+        </p:spPr>
+        <p:style>
+          <a:lnRef idx="1">
+            <a:schemeClr val="accent1"/>
+          </a:lnRef>
+          <a:fillRef idx="0">
+            <a:schemeClr val="accent1"/>
+          </a:fillRef>
+          <a:effectRef idx="0">
+            <a:schemeClr val="accent1"/>
+          </a:effectRef>
+          <a:fontRef idx="minor">
+            <a:schemeClr val="tx1"/>
+          </a:fontRef>
+        </p:style>
+      </p:cxnSp>
+      <p:pic>
+        <p:nvPicPr>
+          <p:cNvPr id="19" name="Immagine 18"/>
+          <p:cNvPicPr>
+            <a:picLocks noChangeAspect="1"/>
+          </p:cNvPicPr>
+          <p:nvPr/>
+        </p:nvPicPr>
+        <p:blipFill rotWithShape="1">
+          <a:blip r:embed="rId3"/>
+          <a:srcRect t="9656"/>
+          <a:stretch/>
+        </p:blipFill>
+        <p:spPr>
+          <a:xfrm>
+            <a:off x="1074127" y="2586101"/>
+            <a:ext cx="4955198" cy="4257675"/>
+          </a:xfrm>
+          <a:prstGeom prst="rect">
+            <a:avLst/>
+          </a:prstGeom>
+        </p:spPr>
+      </p:pic>
+      <p:cxnSp>
+        <p:nvCxnSpPr>
+          <p:cNvPr id="12" name="Connettore 1 11"/>
+          <p:cNvCxnSpPr/>
+          <p:nvPr/>
+        </p:nvCxnSpPr>
+        <p:spPr>
+          <a:xfrm>
+            <a:off x="3924300" y="5057775"/>
+            <a:ext cx="2105025" cy="0"/>
+          </a:xfrm>
+          <a:prstGeom prst="line">
+            <a:avLst/>
+          </a:prstGeom>
         </p:spPr>
         <p:style>
           <a:lnRef idx="1">
@@ -6354,18 +6615,21 @@
       </p:cxnSp>
       <p:cxnSp>
         <p:nvCxnSpPr>
-          <p:cNvPr id="22" name="Connettore 1 21"/>
+          <p:cNvPr id="21" name="Connettore 2 20"/>
           <p:cNvCxnSpPr/>
           <p:nvPr/>
         </p:nvCxnSpPr>
         <p:spPr>
           <a:xfrm>
-            <a:off x="7146131" y="1690688"/>
-            <a:ext cx="0" cy="669131"/>
-          </a:xfrm>
-          <a:prstGeom prst="line">
+            <a:off x="5257800" y="5486400"/>
+            <a:ext cx="1790700" cy="0"/>
+          </a:xfrm>
+          <a:prstGeom prst="straightConnector1">
             <a:avLst/>
           </a:prstGeom>
+          <a:ln>
+            <a:tailEnd type="triangle"/>
+          </a:ln>
         </p:spPr>
         <p:style>
           <a:lnRef idx="1">
@@ -6389,9 +6653,74 @@
           <p:nvPr/>
         </p:nvCxnSpPr>
         <p:spPr>
-          <a:xfrm flipH="1">
-            <a:off x="7146129" y="4614863"/>
-            <a:ext cx="2" cy="531063"/>
+          <a:xfrm>
+            <a:off x="7099300" y="5057775"/>
+            <a:ext cx="0" cy="581025"/>
+          </a:xfrm>
+          <a:prstGeom prst="line">
+            <a:avLst/>
+          </a:prstGeom>
+        </p:spPr>
+        <p:style>
+          <a:lnRef idx="1">
+            <a:schemeClr val="accent1"/>
+          </a:lnRef>
+          <a:fillRef idx="0">
+            <a:schemeClr val="accent1"/>
+          </a:fillRef>
+          <a:effectRef idx="0">
+            <a:schemeClr val="accent1"/>
+          </a:effectRef>
+          <a:fontRef idx="minor">
+            <a:schemeClr val="tx1"/>
+          </a:fontRef>
+        </p:style>
+      </p:cxnSp>
+      <p:cxnSp>
+        <p:nvCxnSpPr>
+          <p:cNvPr id="27" name="Connettore 4 26"/>
+          <p:cNvCxnSpPr/>
+          <p:nvPr/>
+        </p:nvCxnSpPr>
+        <p:spPr>
+          <a:xfrm flipV="1">
+            <a:off x="3924299" y="3390900"/>
+            <a:ext cx="3124201" cy="1906704"/>
+          </a:xfrm>
+          <a:prstGeom prst="bentConnector3">
+            <a:avLst>
+              <a:gd name="adj1" fmla="val 79268"/>
+            </a:avLst>
+          </a:prstGeom>
+          <a:ln>
+            <a:tailEnd type="triangle"/>
+          </a:ln>
+        </p:spPr>
+        <p:style>
+          <a:lnRef idx="1">
+            <a:schemeClr val="accent1"/>
+          </a:lnRef>
+          <a:fillRef idx="0">
+            <a:schemeClr val="accent1"/>
+          </a:fillRef>
+          <a:effectRef idx="0">
+            <a:schemeClr val="accent1"/>
+          </a:effectRef>
+          <a:fontRef idx="minor">
+            <a:schemeClr val="tx1"/>
+          </a:fontRef>
+        </p:style>
+      </p:cxnSp>
+      <p:cxnSp>
+        <p:nvCxnSpPr>
+          <p:cNvPr id="34" name="Connettore 1 33"/>
+          <p:cNvCxnSpPr/>
+          <p:nvPr/>
+        </p:nvCxnSpPr>
+        <p:spPr>
+          <a:xfrm>
+            <a:off x="7099300" y="2205609"/>
+            <a:ext cx="0" cy="1864741"/>
           </a:xfrm>
           <a:prstGeom prst="line">
             <a:avLst/>
@@ -6415,7 +6744,7 @@
     </p:spTree>
     <p:extLst>
       <p:ext uri="{BB962C8B-B14F-4D97-AF65-F5344CB8AC3E}">
-        <p14:creationId xmlns:p14="http://schemas.microsoft.com/office/powerpoint/2010/main" val="3434721489"/>
+        <p14:creationId xmlns:p14="http://schemas.microsoft.com/office/powerpoint/2010/main" val="169563731"/>
       </p:ext>
     </p:extLst>
   </p:cSld>

</xml_diff>